<commit_message>
Update Poster first Commit
Our Purple color is:  HEX #911dee
</commit_message>
<xml_diff>
--- a/Extras/Final_project_poster-Template_R02_29.11.2020.pptx
+++ b/Extras/Final_project_poster-Template_R02_29.11.2020.pptx
@@ -243,7 +243,7 @@
           <a:p>
             <a:fld id="{96F86DA2-6F35-4111-ACB3-E2300C0C7C15}" type="datetimeFigureOut">
               <a:rPr lang="en-GB" smtClean="0"/>
-              <a:t>11/02/2023</a:t>
+              <a:t>12/02/2023</a:t>
             </a:fld>
             <a:endParaRPr lang="en-GB"/>
           </a:p>
@@ -413,7 +413,7 @@
           <a:p>
             <a:fld id="{96F86DA2-6F35-4111-ACB3-E2300C0C7C15}" type="datetimeFigureOut">
               <a:rPr lang="en-GB" smtClean="0"/>
-              <a:t>11/02/2023</a:t>
+              <a:t>12/02/2023</a:t>
             </a:fld>
             <a:endParaRPr lang="en-GB"/>
           </a:p>
@@ -593,7 +593,7 @@
           <a:p>
             <a:fld id="{96F86DA2-6F35-4111-ACB3-E2300C0C7C15}" type="datetimeFigureOut">
               <a:rPr lang="en-GB" smtClean="0"/>
-              <a:t>11/02/2023</a:t>
+              <a:t>12/02/2023</a:t>
             </a:fld>
             <a:endParaRPr lang="en-GB"/>
           </a:p>
@@ -763,7 +763,7 @@
           <a:p>
             <a:fld id="{96F86DA2-6F35-4111-ACB3-E2300C0C7C15}" type="datetimeFigureOut">
               <a:rPr lang="en-GB" smtClean="0"/>
-              <a:t>11/02/2023</a:t>
+              <a:t>12/02/2023</a:t>
             </a:fld>
             <a:endParaRPr lang="en-GB"/>
           </a:p>
@@ -1007,7 +1007,7 @@
           <a:p>
             <a:fld id="{96F86DA2-6F35-4111-ACB3-E2300C0C7C15}" type="datetimeFigureOut">
               <a:rPr lang="en-GB" smtClean="0"/>
-              <a:t>11/02/2023</a:t>
+              <a:t>12/02/2023</a:t>
             </a:fld>
             <a:endParaRPr lang="en-GB"/>
           </a:p>
@@ -1239,7 +1239,7 @@
           <a:p>
             <a:fld id="{96F86DA2-6F35-4111-ACB3-E2300C0C7C15}" type="datetimeFigureOut">
               <a:rPr lang="en-GB" smtClean="0"/>
-              <a:t>11/02/2023</a:t>
+              <a:t>12/02/2023</a:t>
             </a:fld>
             <a:endParaRPr lang="en-GB"/>
           </a:p>
@@ -1606,7 +1606,7 @@
           <a:p>
             <a:fld id="{96F86DA2-6F35-4111-ACB3-E2300C0C7C15}" type="datetimeFigureOut">
               <a:rPr lang="en-GB" smtClean="0"/>
-              <a:t>11/02/2023</a:t>
+              <a:t>12/02/2023</a:t>
             </a:fld>
             <a:endParaRPr lang="en-GB"/>
           </a:p>
@@ -1724,7 +1724,7 @@
           <a:p>
             <a:fld id="{96F86DA2-6F35-4111-ACB3-E2300C0C7C15}" type="datetimeFigureOut">
               <a:rPr lang="en-GB" smtClean="0"/>
-              <a:t>11/02/2023</a:t>
+              <a:t>12/02/2023</a:t>
             </a:fld>
             <a:endParaRPr lang="en-GB"/>
           </a:p>
@@ -1819,7 +1819,7 @@
           <a:p>
             <a:fld id="{96F86DA2-6F35-4111-ACB3-E2300C0C7C15}" type="datetimeFigureOut">
               <a:rPr lang="en-GB" smtClean="0"/>
-              <a:t>11/02/2023</a:t>
+              <a:t>12/02/2023</a:t>
             </a:fld>
             <a:endParaRPr lang="en-GB"/>
           </a:p>
@@ -2096,7 +2096,7 @@
           <a:p>
             <a:fld id="{96F86DA2-6F35-4111-ACB3-E2300C0C7C15}" type="datetimeFigureOut">
               <a:rPr lang="en-GB" smtClean="0"/>
-              <a:t>11/02/2023</a:t>
+              <a:t>12/02/2023</a:t>
             </a:fld>
             <a:endParaRPr lang="en-GB"/>
           </a:p>
@@ -2353,7 +2353,7 @@
           <a:p>
             <a:fld id="{96F86DA2-6F35-4111-ACB3-E2300C0C7C15}" type="datetimeFigureOut">
               <a:rPr lang="en-GB" smtClean="0"/>
-              <a:t>11/02/2023</a:t>
+              <a:t>12/02/2023</a:t>
             </a:fld>
             <a:endParaRPr lang="en-GB"/>
           </a:p>
@@ -2566,7 +2566,7 @@
           <a:p>
             <a:fld id="{96F86DA2-6F35-4111-ACB3-E2300C0C7C15}" type="datetimeFigureOut">
               <a:rPr lang="en-GB" smtClean="0"/>
-              <a:t>11/02/2023</a:t>
+              <a:t>12/02/2023</a:t>
             </a:fld>
             <a:endParaRPr lang="en-GB"/>
           </a:p>
@@ -3351,261 +3351,477 @@
       </p:sp>
       <p:sp>
         <p:nvSpPr>
-          <p:cNvPr id="5" name="TextBox 4">
+          <p:cNvPr id="2" name="תרשים זרימה: תהליך חלופי 1">
             <a:extLst>
               <a:ext uri="{FF2B5EF4-FFF2-40B4-BE49-F238E27FC236}">
-                <a16:creationId xmlns:a16="http://schemas.microsoft.com/office/drawing/2014/main" id="{08B97E8D-8EAC-4A73-A1C8-30FEEE629843}"/>
+                <a16:creationId xmlns:a16="http://schemas.microsoft.com/office/drawing/2014/main" id="{477D5BC6-C315-7F0F-B757-93796B2FFB8D}"/>
               </a:ext>
             </a:extLst>
           </p:cNvPr>
-          <p:cNvSpPr txBox="1"/>
+          <p:cNvSpPr/>
           <p:nvPr/>
         </p:nvSpPr>
         <p:spPr>
           <a:xfrm>
-            <a:off x="2911641" y="8720406"/>
-            <a:ext cx="19659601" cy="14496276"/>
+            <a:off x="2183578" y="22053766"/>
+            <a:ext cx="14001301" cy="5791200"/>
           </a:xfrm>
-          <a:prstGeom prst="rect">
+          <a:prstGeom prst="flowChartAlternateProcess">
             <a:avLst/>
           </a:prstGeom>
           <a:solidFill>
-            <a:schemeClr val="bg1">
-              <a:lumMod val="85000"/>
-            </a:schemeClr>
+            <a:srgbClr val="911DEE"/>
           </a:solidFill>
         </p:spPr>
-        <p:txBody>
-          <a:bodyPr wrap="square" rtlCol="0">
-            <a:spAutoFit/>
-          </a:bodyPr>
-          <a:lstStyle/>
-          <a:p>
-            <a:pPr marL="914400" indent="-914400">
-              <a:buFont typeface="+mj-lt"/>
-              <a:buAutoNum type="arabicPeriod"/>
-            </a:pPr>
-            <a:r>
-              <a:rPr lang="en-US" sz="3600" dirty="0"/>
-              <a:t>You are not allowed to change poster size B1 (70x100 cm).</a:t>
-            </a:r>
-          </a:p>
-          <a:p>
-            <a:pPr marL="914400" indent="-914400">
-              <a:buFont typeface="+mj-lt"/>
-              <a:buAutoNum type="arabicPeriod"/>
-            </a:pPr>
-            <a:r>
-              <a:rPr lang="en-US" sz="3600" dirty="0"/>
-              <a:t>You are not allowed to change the header section format.</a:t>
-            </a:r>
-          </a:p>
-          <a:p>
-            <a:pPr marL="914400" indent="-914400">
-              <a:buFont typeface="+mj-lt"/>
-              <a:buAutoNum type="arabicPeriod"/>
-            </a:pPr>
-            <a:r>
-              <a:rPr lang="en-US" sz="3600" dirty="0"/>
-              <a:t>The poster can be made in any of the two languages - Hebrew / English</a:t>
-            </a:r>
-          </a:p>
-          <a:p>
-            <a:pPr marL="914400" indent="-914400">
-              <a:buFont typeface="+mj-lt"/>
-              <a:buAutoNum type="arabicPeriod"/>
-            </a:pPr>
-            <a:r>
-              <a:rPr lang="en-US" sz="3600" dirty="0"/>
-              <a:t>Project name size should be between 74-78.</a:t>
-            </a:r>
-          </a:p>
-          <a:p>
-            <a:pPr marL="914400" indent="-914400">
-              <a:buFont typeface="+mj-lt"/>
-              <a:buAutoNum type="arabicPeriod"/>
-            </a:pPr>
-            <a:r>
-              <a:rPr lang="en-US" sz="3600" dirty="0"/>
-              <a:t>Section titles should have size between 52-56.</a:t>
-            </a:r>
-            <a:endParaRPr lang="he-IL" sz="3600" dirty="0"/>
-          </a:p>
-          <a:p>
-            <a:pPr marL="914400" indent="-914400">
-              <a:buFont typeface="+mj-lt"/>
-              <a:buAutoNum type="arabicPeriod"/>
-            </a:pPr>
-            <a:r>
-              <a:rPr lang="en-US" sz="3600" dirty="0"/>
-              <a:t>Year of study and semester of project execution</a:t>
-            </a:r>
-            <a:r>
-              <a:rPr lang="he-IL" sz="3600" dirty="0"/>
-              <a:t> </a:t>
-            </a:r>
-            <a:r>
-              <a:rPr lang="en-US" sz="3600" dirty="0"/>
-              <a:t>have size between 38-42.</a:t>
-            </a:r>
-          </a:p>
-          <a:p>
-            <a:pPr marL="914400" indent="-914400">
-              <a:buFont typeface="+mj-lt"/>
-              <a:buAutoNum type="arabicPeriod"/>
-            </a:pPr>
-            <a:r>
-              <a:rPr lang="en-US" sz="3600" dirty="0"/>
-              <a:t>Lecturer name and participants names should have size between 52-56.</a:t>
-            </a:r>
-            <a:endParaRPr lang="he-IL" sz="3600" dirty="0"/>
-          </a:p>
-          <a:p>
-            <a:pPr marL="914400" indent="-914400">
-              <a:buFont typeface="+mj-lt"/>
-              <a:buAutoNum type="arabicPeriod"/>
-            </a:pPr>
-            <a:r>
-              <a:rPr lang="en-US" sz="3600" dirty="0"/>
-              <a:t>Course name should have size between 38-42.</a:t>
-            </a:r>
-          </a:p>
-          <a:p>
-            <a:pPr marL="914400" indent="-914400">
-              <a:buFont typeface="+mj-lt"/>
-              <a:buAutoNum type="arabicPeriod"/>
-            </a:pPr>
-            <a:r>
-              <a:rPr lang="en-US" sz="3600" dirty="0"/>
-              <a:t>Body texts of the poster should have size between 32-38.</a:t>
-            </a:r>
-          </a:p>
-          <a:p>
-            <a:pPr marL="914400" indent="-914400">
-              <a:buFont typeface="+mj-lt"/>
-              <a:buAutoNum type="arabicPeriod"/>
-            </a:pPr>
-            <a:r>
-              <a:rPr lang="en-US" sz="3600" dirty="0"/>
-              <a:t>Replace the current text in the header with correct information.</a:t>
-            </a:r>
-          </a:p>
-          <a:p>
-            <a:pPr marL="914400" indent="-914400">
-              <a:buFont typeface="+mj-lt"/>
-              <a:buAutoNum type="arabicPeriod"/>
-            </a:pPr>
-            <a:r>
-              <a:rPr lang="en-US" sz="3600" dirty="0"/>
-              <a:t>Student  may change the colors, fonts and font sizes of the header within the restrictions as long as header size and format stay unchanged.</a:t>
-            </a:r>
-          </a:p>
-          <a:p>
-            <a:pPr marL="914400" indent="-914400">
-              <a:buFont typeface="+mj-lt"/>
-              <a:buAutoNum type="arabicPeriod"/>
-            </a:pPr>
-            <a:r>
-              <a:rPr lang="en-US" sz="3600" dirty="0"/>
-              <a:t>Student may design the poster's </a:t>
-            </a:r>
-            <a:r>
-              <a:rPr lang="en-US" dirty="0"/>
-              <a:t> </a:t>
-            </a:r>
-            <a:r>
-              <a:rPr lang="en-US" sz="3600" dirty="0"/>
-              <a:t>body section as you please but under these constrains:</a:t>
-            </a:r>
-          </a:p>
-          <a:p>
-            <a:pPr marL="1371600" lvl="1" indent="-914400">
-              <a:buFont typeface="+mj-lt"/>
-              <a:buAutoNum type="alphaLcParenR"/>
-            </a:pPr>
-            <a:r>
-              <a:rPr lang="en-US" sz="3600" dirty="0"/>
-              <a:t>Body must include the following sections in this exact order:</a:t>
-            </a:r>
-          </a:p>
-          <a:p>
-            <a:pPr marL="1828800" lvl="2" indent="-914400">
+        <p:style>
+          <a:lnRef idx="2">
+            <a:schemeClr val="accent1">
+              <a:shade val="50000"/>
+            </a:schemeClr>
+          </a:lnRef>
+          <a:fillRef idx="1">
+            <a:schemeClr val="accent1"/>
+          </a:fillRef>
+          <a:effectRef idx="0">
+            <a:schemeClr val="accent1"/>
+          </a:effectRef>
+          <a:fontRef idx="minor">
+            <a:schemeClr val="lt1"/>
+          </a:fontRef>
+        </p:style>
+        <p:txBody>
+          <a:bodyPr rtlCol="0" anchor="ctr"/>
+          <a:lstStyle/>
+          <a:p>
+            <a:endParaRPr lang="en-US" sz="3200" b="1" u="sng" dirty="0"/>
+          </a:p>
+          <a:p>
+            <a:r>
+              <a:rPr lang="en-US" sz="3200" b="1" u="sng" dirty="0"/>
+              <a:t>Discussions </a:t>
+            </a:r>
+          </a:p>
+          <a:p>
+            <a:pPr marL="457200" indent="-457200">
               <a:buFont typeface="Arial" panose="020B0604020202020204" pitchFamily="34" charset="0"/>
               <a:buChar char="•"/>
             </a:pPr>
             <a:r>
-              <a:rPr lang="en-US" sz="3600" dirty="0"/>
-              <a:t>Introduction – overview of the project.</a:t>
-            </a:r>
-          </a:p>
-          <a:p>
-            <a:pPr marL="1828800" lvl="2" indent="-914400">
+              <a:rPr lang="en-US" sz="3200" b="1" dirty="0"/>
+              <a:t>Social sharing features:</a:t>
+            </a:r>
+            <a:r>
+              <a:rPr lang="en-US" sz="3200" dirty="0"/>
+              <a:t> allowing users to share their favorite cocktails on social media platforms and enabling other users to try and rate these cocktails.</a:t>
+            </a:r>
+          </a:p>
+          <a:p>
+            <a:pPr marL="457200" indent="-457200">
               <a:buFont typeface="Arial" panose="020B0604020202020204" pitchFamily="34" charset="0"/>
               <a:buChar char="•"/>
             </a:pPr>
             <a:r>
-              <a:rPr lang="en-US" sz="3600" dirty="0"/>
-              <a:t>&lt;Read part (b)&gt;</a:t>
-            </a:r>
-          </a:p>
-          <a:p>
-            <a:pPr marL="1828800" lvl="2" indent="-914400">
+              <a:rPr lang="en-US" sz="3200" b="1" dirty="0"/>
+              <a:t>Expansion of the database:</a:t>
+            </a:r>
+            <a:r>
+              <a:rPr lang="en-US" sz="3200" dirty="0"/>
+              <a:t> adding more cocktail recipes to the database, as well as including information about the history and origin of each cocktail, creating an educational and informative experience for users.</a:t>
+            </a:r>
+          </a:p>
+          <a:p>
+            <a:pPr marL="457200" indent="-457200">
               <a:buFont typeface="Arial" panose="020B0604020202020204" pitchFamily="34" charset="0"/>
               <a:buChar char="•"/>
             </a:pPr>
             <a:r>
-              <a:rPr lang="en-US" sz="3600" dirty="0"/>
-              <a:t>Conclusions – achieved goals, received results and their comparison to the defined targets of project as set at its beginning.</a:t>
-            </a:r>
-          </a:p>
-          <a:p>
-            <a:pPr marL="1828800" lvl="2" indent="-914400">
+              <a:rPr lang="en-US" sz="3200" b="1" dirty="0"/>
+              <a:t>Personalization:</a:t>
+            </a:r>
+            <a:r>
+              <a:rPr lang="en-US" sz="3200" dirty="0"/>
+              <a:t> allowing users to personalize their experience, such as creating a profile, setting up their preferences, and saving their favorite cocktails, leading to a more tailored experience for the user.</a:t>
+            </a:r>
+          </a:p>
+          <a:p>
+            <a:endParaRPr lang="en-US" sz="3200" dirty="0"/>
+          </a:p>
+        </p:txBody>
+      </p:sp>
+      <p:sp>
+        <p:nvSpPr>
+          <p:cNvPr id="6" name="תרשים זרימה: תהליך חלופי 5">
+            <a:extLst>
+              <a:ext uri="{FF2B5EF4-FFF2-40B4-BE49-F238E27FC236}">
+                <a16:creationId xmlns:a16="http://schemas.microsoft.com/office/drawing/2014/main" id="{14A958C0-53AB-CDE3-8D48-4F2EB8249831}"/>
+              </a:ext>
+            </a:extLst>
+          </p:cNvPr>
+          <p:cNvSpPr/>
+          <p:nvPr/>
+        </p:nvSpPr>
+        <p:spPr>
+          <a:xfrm>
+            <a:off x="4190999" y="5503382"/>
+            <a:ext cx="18762785" cy="8688555"/>
+          </a:xfrm>
+          <a:prstGeom prst="flowChartAlternateProcess">
+            <a:avLst/>
+          </a:prstGeom>
+          <a:solidFill>
+            <a:srgbClr val="911DEE"/>
+          </a:solidFill>
+        </p:spPr>
+        <p:style>
+          <a:lnRef idx="2">
+            <a:schemeClr val="accent1">
+              <a:shade val="50000"/>
+            </a:schemeClr>
+          </a:lnRef>
+          <a:fillRef idx="1">
+            <a:schemeClr val="accent1"/>
+          </a:fillRef>
+          <a:effectRef idx="0">
+            <a:schemeClr val="accent1"/>
+          </a:effectRef>
+          <a:fontRef idx="minor">
+            <a:schemeClr val="lt1"/>
+          </a:fontRef>
+        </p:style>
+        <p:txBody>
+          <a:bodyPr rtlCol="0" anchor="ctr"/>
+          <a:lstStyle/>
+          <a:p>
+            <a:r>
+              <a:rPr lang="en-US" sz="3800" b="1" u="sng" dirty="0"/>
+              <a:t>Introduction</a:t>
+            </a:r>
+          </a:p>
+          <a:p>
+            <a:r>
+              <a:rPr lang="en-US" sz="3800" dirty="0"/>
+              <a:t>ETZ Cocktails is a fun and easy-to-use Android app for anyone who loves cocktails. The app allows users to search for cocktail recipes by name or ingredient, add their own custom recipes, and save their favorite cocktails for quick and easy reference. With a user-friendly interface and a comprehensive database of cocktail recipes, ETZ Cocktails is the perfect app for mixologists, bartenders, and anyone who loves to shake up a good drink. Built using the MVVM architectural pattern and a variety of Android Jetpack components, the app is fast, reliable, and easy to navigate. Whether you're a seasoned bartender or just getting started, ETZ Cocktails is the perfect app to help you discover new and exciting drinks.</a:t>
+            </a:r>
+          </a:p>
+          <a:p>
+            <a:r>
+              <a:rPr lang="en-US" sz="3800" dirty="0"/>
+              <a:t>The app works both online and offline.</a:t>
+            </a:r>
+          </a:p>
+          <a:p>
+            <a:pPr marL="457200" indent="-457200">
               <a:buFont typeface="Arial" panose="020B0604020202020204" pitchFamily="34" charset="0"/>
               <a:buChar char="•"/>
             </a:pPr>
-            <a:r>
-              <a:rPr lang="en-US" sz="3600" dirty="0"/>
-              <a:t>Discussions – vision of further development of the project, QR code to the video and source codes of the project (if applicable).</a:t>
-            </a:r>
-          </a:p>
-          <a:p>
-            <a:pPr marL="1371600" lvl="1" indent="-914400">
-              <a:buFont typeface="+mj-lt"/>
-              <a:buAutoNum type="alphaLcParenR"/>
-            </a:pPr>
-            <a:r>
-              <a:rPr lang="en-US" sz="3600" dirty="0"/>
-              <a:t>In (a), the blank paragraph is where you add your own section/s. You must add at least one section and you cannot add more than two sections.</a:t>
-            </a:r>
-          </a:p>
-          <a:p>
-            <a:pPr marL="914400" indent="-914400">
-              <a:buFont typeface="+mj-lt"/>
-              <a:buAutoNum type="arabicPeriod"/>
-            </a:pPr>
-            <a:r>
-              <a:rPr lang="en-US" sz="3600" dirty="0"/>
-              <a:t>When you submit the poster, do so in two files: PowerPoint presentation (this file) and PDF file.</a:t>
-            </a:r>
-          </a:p>
-          <a:p>
-            <a:pPr marL="914400" indent="-914400">
-              <a:buFont typeface="+mj-lt"/>
-              <a:buAutoNum type="arabicPeriod"/>
-            </a:pPr>
-            <a:r>
-              <a:rPr lang="en-US" sz="3600" dirty="0"/>
-              <a:t>Any images, graphs or charts included in the poster, must have high resolution, sharp markings and texts.</a:t>
-            </a:r>
-          </a:p>
-          <a:p>
-            <a:pPr marL="914400" indent="-914400">
-              <a:buFont typeface="+mj-lt"/>
-              <a:buAutoNum type="arabicPeriod"/>
-            </a:pPr>
-            <a:r>
-              <a:rPr lang="en-US" sz="3600" dirty="0"/>
-              <a:t>This poster template is in accordance with written above limitations.</a:t>
+            <a:endParaRPr lang="en-US" sz="3800" dirty="0"/>
+          </a:p>
+          <a:p>
+            <a:pPr algn="ctr"/>
+            <a:endParaRPr lang="en-US" sz="3800" dirty="0"/>
+          </a:p>
+        </p:txBody>
+      </p:sp>
+      <p:sp>
+        <p:nvSpPr>
+          <p:cNvPr id="7" name="תרשים זרימה: תהליך חלופי 6">
+            <a:extLst>
+              <a:ext uri="{FF2B5EF4-FFF2-40B4-BE49-F238E27FC236}">
+                <a16:creationId xmlns:a16="http://schemas.microsoft.com/office/drawing/2014/main" id="{6C42B0F6-BE2F-FB2F-69AF-6F37E7731FEC}"/>
+              </a:ext>
+            </a:extLst>
+          </p:cNvPr>
+          <p:cNvSpPr/>
+          <p:nvPr/>
+        </p:nvSpPr>
+        <p:spPr>
+          <a:xfrm>
+            <a:off x="2183579" y="14553886"/>
+            <a:ext cx="9305036" cy="7137931"/>
+          </a:xfrm>
+          <a:prstGeom prst="flowChartAlternateProcess">
+            <a:avLst/>
+          </a:prstGeom>
+          <a:solidFill>
+            <a:srgbClr val="911DEE"/>
+          </a:solidFill>
+        </p:spPr>
+        <p:style>
+          <a:lnRef idx="2">
+            <a:schemeClr val="accent1">
+              <a:shade val="50000"/>
+            </a:schemeClr>
+          </a:lnRef>
+          <a:fillRef idx="1">
+            <a:schemeClr val="accent1"/>
+          </a:fillRef>
+          <a:effectRef idx="0">
+            <a:schemeClr val="accent1"/>
+          </a:effectRef>
+          <a:fontRef idx="minor">
+            <a:schemeClr val="lt1"/>
+          </a:fontRef>
+        </p:style>
+        <p:txBody>
+          <a:bodyPr rtlCol="0" anchor="ctr"/>
+          <a:lstStyle/>
+          <a:p>
+            <a:r>
+              <a:rPr lang="en-US" sz="3200" b="1" u="sng" dirty="0"/>
+              <a:t>Conclusions</a:t>
+            </a:r>
+          </a:p>
+          <a:p>
+            <a:r>
+              <a:rPr lang="en-US" sz="3200" dirty="0"/>
+              <a:t>First, we came here to learn and expand our minds and knowledge.</a:t>
+            </a:r>
+          </a:p>
+          <a:p>
+            <a:r>
+              <a:rPr lang="en-US" sz="3200" dirty="0"/>
+              <a:t>Secondly, we’ve wanted to develop an intuitive app that’s easy yet powerful that provides all the necessaries for the user.</a:t>
+            </a:r>
+          </a:p>
+          <a:p>
+            <a:r>
+              <a:rPr lang="en-US" sz="3200" dirty="0"/>
+              <a:t>Moreover, our final product should be a product that we’ll be proud at, such that utilize modern technology and design principles.</a:t>
+            </a:r>
+          </a:p>
+          <a:p>
+            <a:endParaRPr lang="en-US" sz="3200" dirty="0"/>
+          </a:p>
+          <a:p>
+            <a:r>
+              <a:rPr lang="en-US" sz="3200" b="1" u="sng" dirty="0" err="1"/>
+              <a:t>Acheived</a:t>
+            </a:r>
+            <a:r>
+              <a:rPr lang="en-US" sz="3200" b="1" u="sng" dirty="0"/>
+              <a:t> Goals Vs Target Goals</a:t>
+            </a:r>
+          </a:p>
+          <a:p>
+            <a:endParaRPr lang="en-US" sz="3200" dirty="0"/>
+          </a:p>
+        </p:txBody>
+      </p:sp>
+      <p:sp>
+        <p:nvSpPr>
+          <p:cNvPr id="8" name="תרשים זרימה: תהליך חלופי 7">
+            <a:extLst>
+              <a:ext uri="{FF2B5EF4-FFF2-40B4-BE49-F238E27FC236}">
+                <a16:creationId xmlns:a16="http://schemas.microsoft.com/office/drawing/2014/main" id="{BA7EC542-A62D-C6F0-6D0F-4F09E4F2629B}"/>
+              </a:ext>
+            </a:extLst>
+          </p:cNvPr>
+          <p:cNvSpPr/>
+          <p:nvPr/>
+        </p:nvSpPr>
+        <p:spPr>
+          <a:xfrm>
+            <a:off x="12568681" y="14553886"/>
+            <a:ext cx="10385103" cy="7137931"/>
+          </a:xfrm>
+          <a:prstGeom prst="flowChartAlternateProcess">
+            <a:avLst/>
+          </a:prstGeom>
+          <a:solidFill>
+            <a:srgbClr val="911DEE"/>
+          </a:solidFill>
+        </p:spPr>
+        <p:style>
+          <a:lnRef idx="2">
+            <a:schemeClr val="accent1">
+              <a:shade val="50000"/>
+            </a:schemeClr>
+          </a:lnRef>
+          <a:fillRef idx="1">
+            <a:schemeClr val="accent1"/>
+          </a:fillRef>
+          <a:effectRef idx="0">
+            <a:schemeClr val="accent1"/>
+          </a:effectRef>
+          <a:fontRef idx="minor">
+            <a:schemeClr val="lt1"/>
+          </a:fontRef>
+        </p:style>
+        <p:txBody>
+          <a:bodyPr rtlCol="0" anchor="ctr"/>
+          <a:lstStyle/>
+          <a:p>
+            <a:r>
+              <a:rPr lang="en-US" sz="3200" dirty="0"/>
+              <a:t>Kotlin, Android Studio, Retrofit, Android Jetpack, Glide, </a:t>
+            </a:r>
+          </a:p>
+          <a:p>
+            <a:endParaRPr lang="en-US" sz="3200" dirty="0"/>
+          </a:p>
+          <a:p>
+            <a:r>
+              <a:rPr lang="en-US" sz="3200" dirty="0"/>
+              <a:t>* Add Icons</a:t>
+            </a:r>
+          </a:p>
+        </p:txBody>
+      </p:sp>
+      <p:sp>
+        <p:nvSpPr>
+          <p:cNvPr id="9" name="תרשים זרימה: תהליך חלופי 8">
+            <a:extLst>
+              <a:ext uri="{FF2B5EF4-FFF2-40B4-BE49-F238E27FC236}">
+                <a16:creationId xmlns:a16="http://schemas.microsoft.com/office/drawing/2014/main" id="{DBF55C28-E798-17FF-DFF1-8CB071437DDE}"/>
+              </a:ext>
+            </a:extLst>
+          </p:cNvPr>
+          <p:cNvSpPr/>
+          <p:nvPr/>
+        </p:nvSpPr>
+        <p:spPr>
+          <a:xfrm>
+            <a:off x="16992599" y="22053766"/>
+            <a:ext cx="5961183" cy="5587143"/>
+          </a:xfrm>
+          <a:prstGeom prst="flowChartAlternateProcess">
+            <a:avLst/>
+          </a:prstGeom>
+          <a:solidFill>
+            <a:srgbClr val="911DEE"/>
+          </a:solidFill>
+        </p:spPr>
+        <p:style>
+          <a:lnRef idx="2">
+            <a:schemeClr val="accent1">
+              <a:shade val="50000"/>
+            </a:schemeClr>
+          </a:lnRef>
+          <a:fillRef idx="1">
+            <a:schemeClr val="accent1"/>
+          </a:fillRef>
+          <a:effectRef idx="0">
+            <a:schemeClr val="accent1"/>
+          </a:effectRef>
+          <a:fontRef idx="minor">
+            <a:schemeClr val="lt1"/>
+          </a:fontRef>
+        </p:style>
+        <p:txBody>
+          <a:bodyPr rtlCol="0" anchor="ctr"/>
+          <a:lstStyle/>
+          <a:p>
+            <a:r>
+              <a:rPr lang="en-US" sz="3200" b="1" u="sng" dirty="0"/>
+              <a:t>QR Code &amp; </a:t>
+            </a:r>
+            <a:r>
+              <a:rPr lang="en-US" sz="3200" b="1" u="sng" dirty="0" err="1"/>
+              <a:t>Github</a:t>
+            </a:r>
+            <a:r>
+              <a:rPr lang="en-US" sz="3200" b="1" u="sng" dirty="0"/>
+              <a:t> Link</a:t>
+            </a:r>
+            <a:endParaRPr lang="en-US" sz="3200" dirty="0"/>
+          </a:p>
+        </p:txBody>
+      </p:sp>
+      <p:sp>
+        <p:nvSpPr>
+          <p:cNvPr id="10" name="תרשים זרימה: תהליך חלופי 9">
+            <a:extLst>
+              <a:ext uri="{FF2B5EF4-FFF2-40B4-BE49-F238E27FC236}">
+                <a16:creationId xmlns:a16="http://schemas.microsoft.com/office/drawing/2014/main" id="{64E1AFB0-FBDD-86C1-4270-921CDB5D681E}"/>
+              </a:ext>
+            </a:extLst>
+          </p:cNvPr>
+          <p:cNvSpPr/>
+          <p:nvPr/>
+        </p:nvSpPr>
+        <p:spPr>
+          <a:xfrm>
+            <a:off x="2183578" y="28376041"/>
+            <a:ext cx="20770205" cy="5791200"/>
+          </a:xfrm>
+          <a:prstGeom prst="flowChartAlternateProcess">
+            <a:avLst/>
+          </a:prstGeom>
+          <a:solidFill>
+            <a:srgbClr val="911DEE"/>
+          </a:solidFill>
+        </p:spPr>
+        <p:style>
+          <a:lnRef idx="2">
+            <a:schemeClr val="accent1">
+              <a:shade val="50000"/>
+            </a:schemeClr>
+          </a:lnRef>
+          <a:fillRef idx="1">
+            <a:schemeClr val="accent1"/>
+          </a:fillRef>
+          <a:effectRef idx="0">
+            <a:schemeClr val="accent1"/>
+          </a:effectRef>
+          <a:fontRef idx="minor">
+            <a:schemeClr val="lt1"/>
+          </a:fontRef>
+        </p:style>
+        <p:txBody>
+          <a:bodyPr rtlCol="0" anchor="ctr"/>
+          <a:lstStyle/>
+          <a:p>
+            <a:endParaRPr lang="en-US" sz="3200" dirty="0"/>
+          </a:p>
+        </p:txBody>
+      </p:sp>
+      <p:sp>
+        <p:nvSpPr>
+          <p:cNvPr id="11" name="תרשים זרימה: תהליך חלופי 10">
+            <a:extLst>
+              <a:ext uri="{FF2B5EF4-FFF2-40B4-BE49-F238E27FC236}">
+                <a16:creationId xmlns:a16="http://schemas.microsoft.com/office/drawing/2014/main" id="{BA4DF303-0823-4623-18DE-E961675974D7}"/>
+              </a:ext>
+            </a:extLst>
+          </p:cNvPr>
+          <p:cNvSpPr/>
+          <p:nvPr/>
+        </p:nvSpPr>
+        <p:spPr>
+          <a:xfrm>
+            <a:off x="1264919" y="7011772"/>
+            <a:ext cx="2621281" cy="2286000"/>
+          </a:xfrm>
+          <a:prstGeom prst="flowChartAlternateProcess">
+            <a:avLst/>
+          </a:prstGeom>
+          <a:solidFill>
+            <a:srgbClr val="911DEE"/>
+          </a:solidFill>
+        </p:spPr>
+        <p:style>
+          <a:lnRef idx="2">
+            <a:schemeClr val="accent1">
+              <a:shade val="50000"/>
+            </a:schemeClr>
+          </a:lnRef>
+          <a:fillRef idx="1">
+            <a:schemeClr val="accent1"/>
+          </a:fillRef>
+          <a:effectRef idx="0">
+            <a:schemeClr val="accent1"/>
+          </a:effectRef>
+          <a:fontRef idx="minor">
+            <a:schemeClr val="lt1"/>
+          </a:fontRef>
+        </p:style>
+        <p:txBody>
+          <a:bodyPr rtlCol="0" anchor="ctr"/>
+          <a:lstStyle/>
+          <a:p>
+            <a:r>
+              <a:rPr lang="en-US" sz="3200" dirty="0"/>
+              <a:t>Our App icon</a:t>
             </a:r>
           </a:p>
         </p:txBody>

</xml_diff>

<commit_message>
Add Icons & Update Poster
</commit_message>
<xml_diff>
--- a/Extras/Final_project_poster-Template_R02_29.11.2020.pptx
+++ b/Extras/Final_project_poster-Template_R02_29.11.2020.pptx
@@ -2986,7 +2986,7 @@
           <p:nvPr>
             <p:extLst>
               <p:ext uri="{D42A27DB-BD31-4B8C-83A1-F6EECF244321}">
-                <p14:modId xmlns:p14="http://schemas.microsoft.com/office/powerpoint/2010/main" val="770910115"/>
+                <p14:modId xmlns:p14="http://schemas.microsoft.com/office/powerpoint/2010/main" val="589848138"/>
               </p:ext>
             </p:extLst>
           </p:nvPr>
@@ -3175,20 +3175,12 @@
                         <a:defRPr/>
                       </a:pPr>
                       <a:r>
-                        <a:rPr lang="en-GB" sz="5400" b="1" dirty="0">
+                        <a:rPr lang="en-GB" sz="5400" b="1">
                           <a:solidFill>
                             <a:schemeClr val="bg1"/>
                           </a:solidFill>
                         </a:rPr>
-                        <a:t>Eran </a:t>
-                      </a:r>
-                      <a:r>
-                        <a:rPr lang="en-GB" sz="5400" b="1" dirty="0" err="1">
-                          <a:solidFill>
-                            <a:schemeClr val="bg1"/>
-                          </a:solidFill>
-                        </a:rPr>
-                        <a:t>Katzav</a:t>
+                        <a:t>Eran Katsav</a:t>
                       </a:r>
                       <a:endParaRPr lang="en-GB" sz="5400" b="1" dirty="0">
                         <a:solidFill>
@@ -3826,6 +3818,123 @@
           </a:p>
         </p:txBody>
       </p:sp>
+      <p:pic>
+        <p:nvPicPr>
+          <p:cNvPr id="12" name="גרפיקה 11">
+            <a:extLst>
+              <a:ext uri="{FF2B5EF4-FFF2-40B4-BE49-F238E27FC236}">
+                <a16:creationId xmlns:a16="http://schemas.microsoft.com/office/drawing/2014/main" id="{6A13E710-674D-C80C-6E4C-0C5A575C9933}"/>
+              </a:ext>
+            </a:extLst>
+          </p:cNvPr>
+          <p:cNvPicPr>
+            <a:picLocks noChangeAspect="1"/>
+          </p:cNvPicPr>
+          <p:nvPr/>
+        </p:nvPicPr>
+        <p:blipFill>
+          <a:blip r:embed="rId3">
+            <a:extLst>
+              <a:ext uri="{28A0092B-C50C-407E-A947-70E740481C1C}">
+                <a14:useLocalDpi xmlns:a14="http://schemas.microsoft.com/office/drawing/2010/main" val="0"/>
+              </a:ext>
+              <a:ext uri="{96DAC541-7B7A-43D3-8B79-37D633B846F1}">
+                <asvg:svgBlip xmlns:asvg="http://schemas.microsoft.com/office/drawing/2016/SVG/main" r:embed="rId4"/>
+              </a:ext>
+            </a:extLst>
+          </a:blip>
+          <a:stretch>
+            <a:fillRect/>
+          </a:stretch>
+        </p:blipFill>
+        <p:spPr>
+          <a:xfrm>
+            <a:off x="13492419" y="18961340"/>
+            <a:ext cx="2242129" cy="2242129"/>
+          </a:xfrm>
+          <a:prstGeom prst="rect">
+            <a:avLst/>
+          </a:prstGeom>
+        </p:spPr>
+      </p:pic>
+      <p:pic>
+        <p:nvPicPr>
+          <p:cNvPr id="14" name="גרפיקה 13">
+            <a:extLst>
+              <a:ext uri="{FF2B5EF4-FFF2-40B4-BE49-F238E27FC236}">
+                <a16:creationId xmlns:a16="http://schemas.microsoft.com/office/drawing/2014/main" id="{C6E400B5-E71E-1F7B-337C-CC315EBC4DA2}"/>
+              </a:ext>
+            </a:extLst>
+          </p:cNvPr>
+          <p:cNvPicPr>
+            <a:picLocks noChangeAspect="1"/>
+          </p:cNvPicPr>
+          <p:nvPr/>
+        </p:nvPicPr>
+        <p:blipFill>
+          <a:blip r:embed="rId5">
+            <a:extLst>
+              <a:ext uri="{28A0092B-C50C-407E-A947-70E740481C1C}">
+                <a14:useLocalDpi xmlns:a14="http://schemas.microsoft.com/office/drawing/2010/main" val="0"/>
+              </a:ext>
+              <a:ext uri="{96DAC541-7B7A-43D3-8B79-37D633B846F1}">
+                <asvg:svgBlip xmlns:asvg="http://schemas.microsoft.com/office/drawing/2016/SVG/main" r:embed="rId6"/>
+              </a:ext>
+            </a:extLst>
+          </a:blip>
+          <a:stretch>
+            <a:fillRect/>
+          </a:stretch>
+        </p:blipFill>
+        <p:spPr>
+          <a:xfrm>
+            <a:off x="17108617" y="19149453"/>
+            <a:ext cx="2054016" cy="2054016"/>
+          </a:xfrm>
+          <a:prstGeom prst="rect">
+            <a:avLst/>
+          </a:prstGeom>
+        </p:spPr>
+      </p:pic>
+      <p:pic>
+        <p:nvPicPr>
+          <p:cNvPr id="16" name="גרפיקה 15">
+            <a:extLst>
+              <a:ext uri="{FF2B5EF4-FFF2-40B4-BE49-F238E27FC236}">
+                <a16:creationId xmlns:a16="http://schemas.microsoft.com/office/drawing/2014/main" id="{3FFE350A-2B09-04C3-AEC2-8AFC043DCD55}"/>
+              </a:ext>
+            </a:extLst>
+          </p:cNvPr>
+          <p:cNvPicPr>
+            <a:picLocks noChangeAspect="1"/>
+          </p:cNvPicPr>
+          <p:nvPr/>
+        </p:nvPicPr>
+        <p:blipFill>
+          <a:blip r:embed="rId7">
+            <a:extLst>
+              <a:ext uri="{28A0092B-C50C-407E-A947-70E740481C1C}">
+                <a14:useLocalDpi xmlns:a14="http://schemas.microsoft.com/office/drawing/2010/main" val="0"/>
+              </a:ext>
+              <a:ext uri="{96DAC541-7B7A-43D3-8B79-37D633B846F1}">
+                <asvg:svgBlip xmlns:asvg="http://schemas.microsoft.com/office/drawing/2016/SVG/main" r:embed="rId8"/>
+              </a:ext>
+            </a:extLst>
+          </a:blip>
+          <a:stretch>
+            <a:fillRect/>
+          </a:stretch>
+        </p:blipFill>
+        <p:spPr>
+          <a:xfrm>
+            <a:off x="20536702" y="19565891"/>
+            <a:ext cx="1033025" cy="1033025"/>
+          </a:xfrm>
+          <a:prstGeom prst="rect">
+            <a:avLst/>
+          </a:prstGeom>
+        </p:spPr>
+      </p:pic>
     </p:spTree>
     <p:extLst>
       <p:ext uri="{BB962C8B-B14F-4D97-AF65-F5344CB8AC3E}">

</xml_diff>